<commit_message>
Make changes to the documentation
Co-authored-by: Bozhidar Dimov <BADimov21@codingburgas.bg>
Co-authored-by: Yavor Penkov <YDPenkov21@codingburgas.bg>
Co-authored-by: Gospodin Radev <GSRadev21@codingburgas.bg>
Co-authored-by: Kristian Gaydov <KKGaydov21@codingburgas.bg>
</commit_message>
<xml_diff>
--- a/documentation/presentation/DNA.pptx
+++ b/documentation/presentation/DNA.pptx
@@ -275,24 +275,32 @@
 </p:presentation>
 </file>
 
-<file path=ppt/revisionInfo.xml><?xml version="1.0" encoding="utf-8"?>
-<p1510:revInfo xmlns:a="http://schemas.openxmlformats.org/drawingml/2006/main" xmlns:r="http://schemas.openxmlformats.org/officeDocument/2006/relationships" xmlns:p1510="http://schemas.microsoft.com/office/powerpoint/2015/10/main">
-  <p1510:revLst>
-    <p1510:client id="{2C6FE48B-295C-4D19-A1F2-CCE90BF64105}" v="30" dt="2023-11-11T14:47:03.892"/>
-    <p1510:client id="{2DE235E4-1C21-4E5C-9199-0BE372CA7D1F}" v="26" dt="2023-11-11T14:33:53.734"/>
-    <p1510:client id="{3C93F2B0-90B3-4DA5-B1AC-63030DFF744E}" v="57" dt="2023-11-11T14:39:15.001"/>
-    <p1510:client id="{5111B1CC-8C1B-4202-AB27-960C672D5702}" v="19" dt="2023-11-11T14:35:57.161"/>
-    <p1510:client id="{B92D2246-FA7D-45BB-8B7D-BABD7FA746E9}" v="105" dt="2023-11-11T14:22:17.434"/>
-    <p1510:client id="{D4C00FE2-3C5B-443C-B402-0487BDADDACE}" v="84" dt="2023-11-11T14:40:50.349"/>
-    <p1510:client id="{D4E6C40A-D69F-46B6-AE7D-A695D99A5BE3}" v="14" dt="2023-11-11T14:45:26.189"/>
-    <p1510:client id="{DD3B8859-1E04-4780-A1C9-5FCAF93D7065}" v="34" dt="2023-11-11T14:35:21.866"/>
-    <p1510:client id="{F9B3E8E2-2A32-43A3-ACB5-50410F22469B}" v="91" dt="2023-11-11T14:18:46.458"/>
-  </p1510:revLst>
-</p1510:revInfo>
-</file>
-
 <file path=ppt/changesInfos/changesInfo1.xml><?xml version="1.0" encoding="utf-8"?>
 <pc:chgInfo xmlns:a="http://schemas.openxmlformats.org/drawingml/2006/main" xmlns:r="http://schemas.openxmlformats.org/officeDocument/2006/relationships" xmlns:ac="http://schemas.microsoft.com/office/drawing/2013/main/command" xmlns:pc="http://schemas.microsoft.com/office/powerpoint/2013/main/command">
+  <pc:docChgLst>
+    <pc:chgData name="Божидар Димов" userId="6c33bdc79629dce9" providerId="LiveId" clId="{20BE37D5-9B2A-4809-9DBE-08321594E8FE}"/>
+    <pc:docChg chg="modSld">
+      <pc:chgData name="Божидар Димов" userId="6c33bdc79629dce9" providerId="LiveId" clId="{20BE37D5-9B2A-4809-9DBE-08321594E8FE}" dt="2023-11-12T20:49:05.691" v="0" actId="1076"/>
+      <pc:docMkLst>
+        <pc:docMk/>
+      </pc:docMkLst>
+      <pc:sldChg chg="modSp mod">
+        <pc:chgData name="Божидар Димов" userId="6c33bdc79629dce9" providerId="LiveId" clId="{20BE37D5-9B2A-4809-9DBE-08321594E8FE}" dt="2023-11-12T20:49:05.691" v="0" actId="1076"/>
+        <pc:sldMkLst>
+          <pc:docMk/>
+          <pc:sldMk cId="0" sldId="259"/>
+        </pc:sldMkLst>
+        <pc:picChg chg="mod">
+          <ac:chgData name="Божидар Димов" userId="6c33bdc79629dce9" providerId="LiveId" clId="{20BE37D5-9B2A-4809-9DBE-08321594E8FE}" dt="2023-11-12T20:49:05.691" v="0" actId="1076"/>
+          <ac:picMkLst>
+            <pc:docMk/>
+            <pc:sldMk cId="0" sldId="259"/>
+            <ac:picMk id="4" creationId="{54E3A86E-89AA-E80D-2F68-DC5EA7A6C7A7}"/>
+          </ac:picMkLst>
+        </pc:picChg>
+      </pc:sldChg>
+    </pc:docChg>
+  </pc:docChgLst>
   <pc:docChgLst>
     <pc:chgData name="Божидар Ангелов Димов" userId="S::badimov21@codingburgas.bg::4ac52a7d-f803-4ad0-9c8d-f124f1431ff7" providerId="AD" clId="Web-{5111B1CC-8C1B-4202-AB27-960C672D5702}"/>
     <pc:docChg chg="modSld">
@@ -342,82 +350,129 @@
     </pc:docChg>
   </pc:docChgLst>
   <pc:docChgLst>
-    <pc:chgData name="Явор Димитров Пенков" userId="S::ydpenkov21@codingburgas.bg::c3a3b445-f763-459c-a7a5-c3ef0bd27f8c" providerId="AD" clId="Web-{3C93F2B0-90B3-4DA5-B1AC-63030DFF744E}"/>
-    <pc:docChg chg="addSld modSld">
-      <pc:chgData name="Явор Димитров Пенков" userId="S::ydpenkov21@codingburgas.bg::c3a3b445-f763-459c-a7a5-c3ef0bd27f8c" providerId="AD" clId="Web-{3C93F2B0-90B3-4DA5-B1AC-63030DFF744E}" dt="2023-11-11T14:39:15.001" v="38" actId="1076"/>
+    <pc:chgData name="Божидар Ангелов Димов" userId="S::badimov21@codingburgas.bg::4ac52a7d-f803-4ad0-9c8d-f124f1431ff7" providerId="AD" clId="Web-{2DE235E4-1C21-4E5C-9199-0BE372CA7D1F}"/>
+    <pc:docChg chg="modSld">
+      <pc:chgData name="Божидар Ангелов Димов" userId="S::badimov21@codingburgas.bg::4ac52a7d-f803-4ad0-9c8d-f124f1431ff7" providerId="AD" clId="Web-{2DE235E4-1C21-4E5C-9199-0BE372CA7D1F}" dt="2023-11-11T14:33:53.734" v="11"/>
       <pc:docMkLst>
         <pc:docMk/>
       </pc:docMkLst>
-      <pc:sldChg chg="addSp modSp new">
-        <pc:chgData name="Явор Димитров Пенков" userId="S::ydpenkov21@codingburgas.bg::c3a3b445-f763-459c-a7a5-c3ef0bd27f8c" providerId="AD" clId="Web-{3C93F2B0-90B3-4DA5-B1AC-63030DFF744E}" dt="2023-11-11T14:39:15.001" v="38" actId="1076"/>
+      <pc:sldChg chg="delSp modSp">
+        <pc:chgData name="Божидар Ангелов Димов" userId="S::badimov21@codingburgas.bg::4ac52a7d-f803-4ad0-9c8d-f124f1431ff7" providerId="AD" clId="Web-{2DE235E4-1C21-4E5C-9199-0BE372CA7D1F}" dt="2023-11-11T14:33:53.734" v="11"/>
         <pc:sldMkLst>
           <pc:docMk/>
-          <pc:sldMk cId="3836415507" sldId="313"/>
+          <pc:sldMk cId="3136130408" sldId="311"/>
         </pc:sldMkLst>
         <pc:spChg chg="mod">
-          <ac:chgData name="Явор Димитров Пенков" userId="S::ydpenkov21@codingburgas.bg::c3a3b445-f763-459c-a7a5-c3ef0bd27f8c" providerId="AD" clId="Web-{3C93F2B0-90B3-4DA5-B1AC-63030DFF744E}" dt="2023-11-11T14:36:20.620" v="2" actId="20577"/>
+          <ac:chgData name="Божидар Ангелов Димов" userId="S::badimov21@codingburgas.bg::4ac52a7d-f803-4ad0-9c8d-f124f1431ff7" providerId="AD" clId="Web-{2DE235E4-1C21-4E5C-9199-0BE372CA7D1F}" dt="2023-11-11T14:33:21.045" v="3" actId="20577"/>
           <ac:spMkLst>
             <pc:docMk/>
-            <pc:sldMk cId="3836415507" sldId="313"/>
-            <ac:spMk id="2" creationId="{B23B3162-D531-589B-3BDB-E94BFB52E244}"/>
+            <pc:sldMk cId="3136130408" sldId="311"/>
+            <ac:spMk id="6" creationId="{ADEE3209-B418-3837-29A8-953C8D21CED5}"/>
           </ac:spMkLst>
         </pc:spChg>
-        <pc:spChg chg="add mod">
-          <ac:chgData name="Явор Димитров Пенков" userId="S::ydpenkov21@codingburgas.bg::c3a3b445-f763-459c-a7a5-c3ef0bd27f8c" providerId="AD" clId="Web-{3C93F2B0-90B3-4DA5-B1AC-63030DFF744E}" dt="2023-11-11T14:39:15.001" v="38" actId="1076"/>
+        <pc:spChg chg="mod">
+          <ac:chgData name="Божидар Ангелов Димов" userId="S::badimov21@codingburgas.bg::4ac52a7d-f803-4ad0-9c8d-f124f1431ff7" providerId="AD" clId="Web-{2DE235E4-1C21-4E5C-9199-0BE372CA7D1F}" dt="2023-11-11T14:33:22.827" v="4" actId="20577"/>
           <ac:spMkLst>
             <pc:docMk/>
-            <pc:sldMk cId="3836415507" sldId="313"/>
-            <ac:spMk id="3" creationId="{3C6DA31C-CCA7-A5AC-0CFC-FD47516AD7EB}"/>
+            <pc:sldMk cId="3136130408" sldId="311"/>
+            <ac:spMk id="9" creationId="{E2370115-6C6A-EF8B-821B-53ED8B8FC188}"/>
           </ac:spMkLst>
         </pc:spChg>
-        <pc:spChg chg="add mod">
-          <ac:chgData name="Явор Димитров Пенков" userId="S::ydpenkov21@codingburgas.bg::c3a3b445-f763-459c-a7a5-c3ef0bd27f8c" providerId="AD" clId="Web-{3C93F2B0-90B3-4DA5-B1AC-63030DFF744E}" dt="2023-11-11T14:38:49.922" v="32" actId="20577"/>
+        <pc:spChg chg="mod">
+          <ac:chgData name="Божидар Ангелов Димов" userId="S::badimov21@codingburgas.bg::4ac52a7d-f803-4ad0-9c8d-f124f1431ff7" providerId="AD" clId="Web-{2DE235E4-1C21-4E5C-9199-0BE372CA7D1F}" dt="2023-11-11T14:33:34.718" v="10" actId="1076"/>
           <ac:spMkLst>
             <pc:docMk/>
-            <pc:sldMk cId="3836415507" sldId="313"/>
-            <ac:spMk id="4" creationId="{92BFA970-2AB1-CD9A-FE26-E13623D6FB94}"/>
+            <pc:sldMk cId="3136130408" sldId="311"/>
+            <ac:spMk id="11" creationId="{23261F7E-B332-1F08-BBD4-A12A39350FFC}"/>
           </ac:spMkLst>
         </pc:spChg>
-        <pc:spChg chg="add mod">
-          <ac:chgData name="Явор Димитров Пенков" userId="S::ydpenkov21@codingburgas.bg::c3a3b445-f763-459c-a7a5-c3ef0bd27f8c" providerId="AD" clId="Web-{3C93F2B0-90B3-4DA5-B1AC-63030DFF744E}" dt="2023-11-11T14:38:52.875" v="33" actId="20577"/>
+        <pc:spChg chg="mod">
+          <ac:chgData name="Божидар Ангелов Димов" userId="S::badimov21@codingburgas.bg::4ac52a7d-f803-4ad0-9c8d-f124f1431ff7" providerId="AD" clId="Web-{2DE235E4-1C21-4E5C-9199-0BE372CA7D1F}" dt="2023-11-11T14:33:26.796" v="8" actId="20577"/>
           <ac:spMkLst>
             <pc:docMk/>
-            <pc:sldMk cId="3836415507" sldId="313"/>
-            <ac:spMk id="5" creationId="{030658D8-89B8-7AD1-928D-1D6239FCB0F1}"/>
+            <pc:sldMk cId="3136130408" sldId="311"/>
+            <ac:spMk id="13" creationId="{0CD6A70E-B909-F87C-95FF-2633998A354F}"/>
+          </ac:spMkLst>
+        </pc:spChg>
+        <pc:picChg chg="del">
+          <ac:chgData name="Божидар Ангелов Димов" userId="S::badimov21@codingburgas.bg::4ac52a7d-f803-4ad0-9c8d-f124f1431ff7" providerId="AD" clId="Web-{2DE235E4-1C21-4E5C-9199-0BE372CA7D1F}" dt="2023-11-11T14:33:53.734" v="11"/>
+          <ac:picMkLst>
+            <pc:docMk/>
+            <pc:sldMk cId="3136130408" sldId="311"/>
+            <ac:picMk id="7" creationId="{8BBF5E63-6993-1B23-1D69-6235B3A91DB6}"/>
+          </ac:picMkLst>
+        </pc:picChg>
+      </pc:sldChg>
+    </pc:docChg>
+  </pc:docChgLst>
+  <pc:docChgLst>
+    <pc:chgData name="Явор Димитров Пенков" userId="S::ydpenkov21@codingburgas.bg::c3a3b445-f763-459c-a7a5-c3ef0bd27f8c" providerId="AD" clId="Web-{D4E6C40A-D69F-46B6-AE7D-A695D99A5BE3}"/>
+    <pc:docChg chg="modSld">
+      <pc:chgData name="Явор Димитров Пенков" userId="S::ydpenkov21@codingburgas.bg::c3a3b445-f763-459c-a7a5-c3ef0bd27f8c" providerId="AD" clId="Web-{D4E6C40A-D69F-46B6-AE7D-A695D99A5BE3}" dt="2023-11-11T14:45:21.861" v="9" actId="20577"/>
+      <pc:docMkLst>
+        <pc:docMk/>
+      </pc:docMkLst>
+      <pc:sldChg chg="modSp">
+        <pc:chgData name="Явор Димитров Пенков" userId="S::ydpenkov21@codingburgas.bg::c3a3b445-f763-459c-a7a5-c3ef0bd27f8c" providerId="AD" clId="Web-{D4E6C40A-D69F-46B6-AE7D-A695D99A5BE3}" dt="2023-11-11T14:45:21.861" v="9" actId="20577"/>
+        <pc:sldMkLst>
+          <pc:docMk/>
+          <pc:sldMk cId="0" sldId="259"/>
+        </pc:sldMkLst>
+        <pc:spChg chg="mod">
+          <ac:chgData name="Явор Димитров Пенков" userId="S::ydpenkov21@codingburgas.bg::c3a3b445-f763-459c-a7a5-c3ef0bd27f8c" providerId="AD" clId="Web-{D4E6C40A-D69F-46B6-AE7D-A695D99A5BE3}" dt="2023-11-11T14:45:21.861" v="9" actId="20577"/>
+          <ac:spMkLst>
+            <pc:docMk/>
+            <pc:sldMk cId="0" sldId="259"/>
+            <ac:spMk id="3" creationId="{9EE4F092-65F7-707A-7967-A94EB7C0708B}"/>
           </ac:spMkLst>
         </pc:spChg>
       </pc:sldChg>
     </pc:docChg>
   </pc:docChgLst>
   <pc:docChgLst>
-    <pc:chgData name="Божидар Ангелов Димов" userId="S::badimov21@codingburgas.bg::4ac52a7d-f803-4ad0-9c8d-f124f1431ff7" providerId="AD" clId="Web-{2C6FE48B-295C-4D19-A1F2-CCE90BF64105}"/>
+    <pc:chgData name="Божидар Ангелов Димов" userId="S::badimov21@codingburgas.bg::4ac52a7d-f803-4ad0-9c8d-f124f1431ff7" providerId="AD" clId="Web-{F9B3E8E2-2A32-43A3-ACB5-50410F22469B}"/>
     <pc:docChg chg="modSld">
-      <pc:chgData name="Божидар Ангелов Димов" userId="S::badimov21@codingburgas.bg::4ac52a7d-f803-4ad0-9c8d-f124f1431ff7" providerId="AD" clId="Web-{2C6FE48B-295C-4D19-A1F2-CCE90BF64105}" dt="2023-11-11T14:47:03.892" v="27" actId="14100"/>
+      <pc:chgData name="Божидар Ангелов Димов" userId="S::badimov21@codingburgas.bg::4ac52a7d-f803-4ad0-9c8d-f124f1431ff7" providerId="AD" clId="Web-{F9B3E8E2-2A32-43A3-ACB5-50410F22469B}" dt="2023-11-11T14:18:45.551" v="51" actId="20577"/>
       <pc:docMkLst>
         <pc:docMk/>
       </pc:docMkLst>
-      <pc:sldChg chg="addSp modSp">
-        <pc:chgData name="Божидар Ангелов Димов" userId="S::badimov21@codingburgas.bg::4ac52a7d-f803-4ad0-9c8d-f124f1431ff7" providerId="AD" clId="Web-{2C6FE48B-295C-4D19-A1F2-CCE90BF64105}" dt="2023-11-11T14:47:03.892" v="27" actId="14100"/>
+      <pc:sldChg chg="modSp">
+        <pc:chgData name="Божидар Ангелов Димов" userId="S::badimov21@codingburgas.bg::4ac52a7d-f803-4ad0-9c8d-f124f1431ff7" providerId="AD" clId="Web-{F9B3E8E2-2A32-43A3-ACB5-50410F22469B}" dt="2023-11-11T14:17:57.878" v="7" actId="20577"/>
         <pc:sldMkLst>
           <pc:docMk/>
-          <pc:sldMk cId="0" sldId="259"/>
+          <pc:sldMk cId="0" sldId="268"/>
         </pc:sldMkLst>
-        <pc:picChg chg="add mod">
-          <ac:chgData name="Божидар Ангелов Димов" userId="S::badimov21@codingburgas.bg::4ac52a7d-f803-4ad0-9c8d-f124f1431ff7" providerId="AD" clId="Web-{2C6FE48B-295C-4D19-A1F2-CCE90BF64105}" dt="2023-11-11T14:46:42.017" v="23" actId="1076"/>
-          <ac:picMkLst>
+        <pc:spChg chg="mod">
+          <ac:chgData name="Божидар Ангелов Димов" userId="S::badimov21@codingburgas.bg::4ac52a7d-f803-4ad0-9c8d-f124f1431ff7" providerId="AD" clId="Web-{F9B3E8E2-2A32-43A3-ACB5-50410F22469B}" dt="2023-11-11T14:17:57.878" v="7" actId="20577"/>
+          <ac:spMkLst>
             <pc:docMk/>
-            <pc:sldMk cId="0" sldId="259"/>
-            <ac:picMk id="2" creationId="{E0FDAAEE-3E13-B0F0-6A60-F38D012CD024}"/>
-          </ac:picMkLst>
-        </pc:picChg>
-        <pc:picChg chg="add mod">
-          <ac:chgData name="Божидар Ангелов Димов" userId="S::badimov21@codingburgas.bg::4ac52a7d-f803-4ad0-9c8d-f124f1431ff7" providerId="AD" clId="Web-{2C6FE48B-295C-4D19-A1F2-CCE90BF64105}" dt="2023-11-11T14:47:03.892" v="27" actId="14100"/>
-          <ac:picMkLst>
+            <pc:sldMk cId="0" sldId="268"/>
+            <ac:spMk id="682" creationId="{00000000-0000-0000-0000-000000000000}"/>
+          </ac:spMkLst>
+        </pc:spChg>
+      </pc:sldChg>
+      <pc:sldChg chg="modSp">
+        <pc:chgData name="Божидар Ангелов Димов" userId="S::badimov21@codingburgas.bg::4ac52a7d-f803-4ad0-9c8d-f124f1431ff7" providerId="AD" clId="Web-{F9B3E8E2-2A32-43A3-ACB5-50410F22469B}" dt="2023-11-11T14:18:45.551" v="51" actId="20577"/>
+        <pc:sldMkLst>
+          <pc:docMk/>
+          <pc:sldMk cId="3136130408" sldId="311"/>
+        </pc:sldMkLst>
+        <pc:spChg chg="mod">
+          <ac:chgData name="Божидар Ангелов Димов" userId="S::badimov21@codingburgas.bg::4ac52a7d-f803-4ad0-9c8d-f124f1431ff7" providerId="AD" clId="Web-{F9B3E8E2-2A32-43A3-ACB5-50410F22469B}" dt="2023-11-11T14:18:32.270" v="31" actId="1076"/>
+          <ac:spMkLst>
             <pc:docMk/>
-            <pc:sldMk cId="0" sldId="259"/>
-            <ac:picMk id="4" creationId="{54E3A86E-89AA-E80D-2F68-DC5EA7A6C7A7}"/>
-          </ac:picMkLst>
-        </pc:picChg>
+            <pc:sldMk cId="3136130408" sldId="311"/>
+            <ac:spMk id="6" creationId="{ADEE3209-B418-3837-29A8-953C8D21CED5}"/>
+          </ac:spMkLst>
+        </pc:spChg>
+        <pc:spChg chg="mod">
+          <ac:chgData name="Божидар Ангелов Димов" userId="S::badimov21@codingburgas.bg::4ac52a7d-f803-4ad0-9c8d-f124f1431ff7" providerId="AD" clId="Web-{F9B3E8E2-2A32-43A3-ACB5-50410F22469B}" dt="2023-11-11T14:18:45.551" v="51" actId="20577"/>
+          <ac:spMkLst>
+            <pc:docMk/>
+            <pc:sldMk cId="3136130408" sldId="311"/>
+            <ac:spMk id="9" creationId="{E2370115-6C6A-EF8B-821B-53ED8B8FC188}"/>
+          </ac:spMkLst>
+        </pc:spChg>
       </pc:sldChg>
     </pc:docChg>
   </pc:docChgLst>
@@ -501,20 +556,20 @@
     </pc:docChg>
   </pc:docChgLst>
   <pc:docChgLst>
-    <pc:chgData name="Божидар Ангелов Димов" userId="S::badimov21@codingburgas.bg::4ac52a7d-f803-4ad0-9c8d-f124f1431ff7" providerId="AD" clId="Web-{2DE235E4-1C21-4E5C-9199-0BE372CA7D1F}"/>
+    <pc:chgData name="Божидар Ангелов Димов" userId="S::badimov21@codingburgas.bg::4ac52a7d-f803-4ad0-9c8d-f124f1431ff7" providerId="AD" clId="Web-{B92D2246-FA7D-45BB-8B7D-BABD7FA746E9}"/>
     <pc:docChg chg="modSld">
-      <pc:chgData name="Божидар Ангелов Димов" userId="S::badimov21@codingburgas.bg::4ac52a7d-f803-4ad0-9c8d-f124f1431ff7" providerId="AD" clId="Web-{2DE235E4-1C21-4E5C-9199-0BE372CA7D1F}" dt="2023-11-11T14:33:53.734" v="11"/>
+      <pc:chgData name="Божидар Ангелов Димов" userId="S::badimov21@codingburgas.bg::4ac52a7d-f803-4ad0-9c8d-f124f1431ff7" providerId="AD" clId="Web-{B92D2246-FA7D-45BB-8B7D-BABD7FA746E9}" dt="2023-11-11T14:22:17.434" v="57" actId="20577"/>
       <pc:docMkLst>
         <pc:docMk/>
       </pc:docMkLst>
-      <pc:sldChg chg="delSp modSp">
-        <pc:chgData name="Божидар Ангелов Димов" userId="S::badimov21@codingburgas.bg::4ac52a7d-f803-4ad0-9c8d-f124f1431ff7" providerId="AD" clId="Web-{2DE235E4-1C21-4E5C-9199-0BE372CA7D1F}" dt="2023-11-11T14:33:53.734" v="11"/>
+      <pc:sldChg chg="modSp">
+        <pc:chgData name="Божидар Ангелов Димов" userId="S::badimov21@codingburgas.bg::4ac52a7d-f803-4ad0-9c8d-f124f1431ff7" providerId="AD" clId="Web-{B92D2246-FA7D-45BB-8B7D-BABD7FA746E9}" dt="2023-11-11T14:22:17.434" v="57" actId="20577"/>
         <pc:sldMkLst>
           <pc:docMk/>
           <pc:sldMk cId="3136130408" sldId="311"/>
         </pc:sldMkLst>
         <pc:spChg chg="mod">
-          <ac:chgData name="Божидар Ангелов Димов" userId="S::badimov21@codingburgas.bg::4ac52a7d-f803-4ad0-9c8d-f124f1431ff7" providerId="AD" clId="Web-{2DE235E4-1C21-4E5C-9199-0BE372CA7D1F}" dt="2023-11-11T14:33:21.045" v="3" actId="20577"/>
+          <ac:chgData name="Божидар Ангелов Димов" userId="S::badimov21@codingburgas.bg::4ac52a7d-f803-4ad0-9c8d-f124f1431ff7" providerId="AD" clId="Web-{B92D2246-FA7D-45BB-8B7D-BABD7FA746E9}" dt="2023-11-11T14:22:01.512" v="53" actId="14100"/>
           <ac:spMkLst>
             <pc:docMk/>
             <pc:sldMk cId="3136130408" sldId="311"/>
@@ -522,7 +577,7 @@
           </ac:spMkLst>
         </pc:spChg>
         <pc:spChg chg="mod">
-          <ac:chgData name="Божидар Ангелов Димов" userId="S::badimov21@codingburgas.bg::4ac52a7d-f803-4ad0-9c8d-f124f1431ff7" providerId="AD" clId="Web-{2DE235E4-1C21-4E5C-9199-0BE372CA7D1F}" dt="2023-11-11T14:33:22.827" v="4" actId="20577"/>
+          <ac:chgData name="Божидар Ангелов Димов" userId="S::badimov21@codingburgas.bg::4ac52a7d-f803-4ad0-9c8d-f124f1431ff7" providerId="AD" clId="Web-{B92D2246-FA7D-45BB-8B7D-BABD7FA746E9}" dt="2023-11-11T14:21:56.621" v="52" actId="20577"/>
           <ac:spMkLst>
             <pc:docMk/>
             <pc:sldMk cId="3136130408" sldId="311"/>
@@ -530,7 +585,7 @@
           </ac:spMkLst>
         </pc:spChg>
         <pc:spChg chg="mod">
-          <ac:chgData name="Божидар Ангелов Димов" userId="S::badimov21@codingburgas.bg::4ac52a7d-f803-4ad0-9c8d-f124f1431ff7" providerId="AD" clId="Web-{2DE235E4-1C21-4E5C-9199-0BE372CA7D1F}" dt="2023-11-11T14:33:34.718" v="10" actId="1076"/>
+          <ac:chgData name="Божидар Ангелов Димов" userId="S::badimov21@codingburgas.bg::4ac52a7d-f803-4ad0-9c8d-f124f1431ff7" providerId="AD" clId="Web-{B92D2246-FA7D-45BB-8B7D-BABD7FA746E9}" dt="2023-11-11T14:22:06.606" v="55" actId="20577"/>
           <ac:spMkLst>
             <pc:docMk/>
             <pc:sldMk cId="3136130408" sldId="311"/>
@@ -538,43 +593,115 @@
           </ac:spMkLst>
         </pc:spChg>
         <pc:spChg chg="mod">
-          <ac:chgData name="Божидар Ангелов Димов" userId="S::badimov21@codingburgas.bg::4ac52a7d-f803-4ad0-9c8d-f124f1431ff7" providerId="AD" clId="Web-{2DE235E4-1C21-4E5C-9199-0BE372CA7D1F}" dt="2023-11-11T14:33:26.796" v="8" actId="20577"/>
+          <ac:chgData name="Божидар Ангелов Димов" userId="S::badimov21@codingburgas.bg::4ac52a7d-f803-4ad0-9c8d-f124f1431ff7" providerId="AD" clId="Web-{B92D2246-FA7D-45BB-8B7D-BABD7FA746E9}" dt="2023-11-11T14:22:17.434" v="57" actId="20577"/>
           <ac:spMkLst>
             <pc:docMk/>
             <pc:sldMk cId="3136130408" sldId="311"/>
             <ac:spMk id="13" creationId="{0CD6A70E-B909-F87C-95FF-2633998A354F}"/>
           </ac:spMkLst>
         </pc:spChg>
-        <pc:picChg chg="del">
-          <ac:chgData name="Божидар Ангелов Димов" userId="S::badimov21@codingburgas.bg::4ac52a7d-f803-4ad0-9c8d-f124f1431ff7" providerId="AD" clId="Web-{2DE235E4-1C21-4E5C-9199-0BE372CA7D1F}" dt="2023-11-11T14:33:53.734" v="11"/>
+        <pc:picChg chg="mod">
+          <ac:chgData name="Божидар Ангелов Димов" userId="S::badimov21@codingburgas.bg::4ac52a7d-f803-4ad0-9c8d-f124f1431ff7" providerId="AD" clId="Web-{B92D2246-FA7D-45BB-8B7D-BABD7FA746E9}" dt="2023-11-11T14:21:01.198" v="41" actId="14100"/>
           <ac:picMkLst>
             <pc:docMk/>
             <pc:sldMk cId="3136130408" sldId="311"/>
-            <ac:picMk id="7" creationId="{8BBF5E63-6993-1B23-1D69-6235B3A91DB6}"/>
+            <ac:picMk id="17" creationId="{4627DF91-4A7A-487E-929E-D03319286854}"/>
+          </ac:picMkLst>
+        </pc:picChg>
+        <pc:picChg chg="mod">
+          <ac:chgData name="Божидар Ангелов Димов" userId="S::badimov21@codingburgas.bg::4ac52a7d-f803-4ad0-9c8d-f124f1431ff7" providerId="AD" clId="Web-{B92D2246-FA7D-45BB-8B7D-BABD7FA746E9}" dt="2023-11-11T14:21:03.713" v="42" actId="14100"/>
+          <ac:picMkLst>
+            <pc:docMk/>
+            <pc:sldMk cId="3136130408" sldId="311"/>
+            <ac:picMk id="19" creationId="{D00790F8-C95B-9A96-C3F2-2CC386C944DD}"/>
+          </ac:picMkLst>
+        </pc:picChg>
+        <pc:picChg chg="mod">
+          <ac:chgData name="Божидар Ангелов Димов" userId="S::badimov21@codingburgas.bg::4ac52a7d-f803-4ad0-9c8d-f124f1431ff7" providerId="AD" clId="Web-{B92D2246-FA7D-45BB-8B7D-BABD7FA746E9}" dt="2023-11-11T14:21:05.432" v="43" actId="14100"/>
+          <ac:picMkLst>
+            <pc:docMk/>
+            <pc:sldMk cId="3136130408" sldId="311"/>
+            <ac:picMk id="21" creationId="{5ACE420D-A20B-D9F3-F245-4FF783DFAFF8}"/>
           </ac:picMkLst>
         </pc:picChg>
       </pc:sldChg>
     </pc:docChg>
   </pc:docChgLst>
   <pc:docChgLst>
-    <pc:chgData name="Явор Димитров Пенков" userId="S::ydpenkov21@codingburgas.bg::c3a3b445-f763-459c-a7a5-c3ef0bd27f8c" providerId="AD" clId="Web-{D4E6C40A-D69F-46B6-AE7D-A695D99A5BE3}"/>
+    <pc:chgData name="Божидар Ангелов Димов" userId="S::badimov21@codingburgas.bg::4ac52a7d-f803-4ad0-9c8d-f124f1431ff7" providerId="AD" clId="Web-{2C6FE48B-295C-4D19-A1F2-CCE90BF64105}"/>
     <pc:docChg chg="modSld">
-      <pc:chgData name="Явор Димитров Пенков" userId="S::ydpenkov21@codingburgas.bg::c3a3b445-f763-459c-a7a5-c3ef0bd27f8c" providerId="AD" clId="Web-{D4E6C40A-D69F-46B6-AE7D-A695D99A5BE3}" dt="2023-11-11T14:45:21.861" v="9" actId="20577"/>
+      <pc:chgData name="Божидар Ангелов Димов" userId="S::badimov21@codingburgas.bg::4ac52a7d-f803-4ad0-9c8d-f124f1431ff7" providerId="AD" clId="Web-{2C6FE48B-295C-4D19-A1F2-CCE90BF64105}" dt="2023-11-11T14:47:03.892" v="27" actId="14100"/>
       <pc:docMkLst>
         <pc:docMk/>
       </pc:docMkLst>
-      <pc:sldChg chg="modSp">
-        <pc:chgData name="Явор Димитров Пенков" userId="S::ydpenkov21@codingburgas.bg::c3a3b445-f763-459c-a7a5-c3ef0bd27f8c" providerId="AD" clId="Web-{D4E6C40A-D69F-46B6-AE7D-A695D99A5BE3}" dt="2023-11-11T14:45:21.861" v="9" actId="20577"/>
+      <pc:sldChg chg="addSp modSp">
+        <pc:chgData name="Божидар Ангелов Димов" userId="S::badimov21@codingburgas.bg::4ac52a7d-f803-4ad0-9c8d-f124f1431ff7" providerId="AD" clId="Web-{2C6FE48B-295C-4D19-A1F2-CCE90BF64105}" dt="2023-11-11T14:47:03.892" v="27" actId="14100"/>
         <pc:sldMkLst>
           <pc:docMk/>
           <pc:sldMk cId="0" sldId="259"/>
         </pc:sldMkLst>
+        <pc:picChg chg="add mod">
+          <ac:chgData name="Божидар Ангелов Димов" userId="S::badimov21@codingburgas.bg::4ac52a7d-f803-4ad0-9c8d-f124f1431ff7" providerId="AD" clId="Web-{2C6FE48B-295C-4D19-A1F2-CCE90BF64105}" dt="2023-11-11T14:46:42.017" v="23" actId="1076"/>
+          <ac:picMkLst>
+            <pc:docMk/>
+            <pc:sldMk cId="0" sldId="259"/>
+            <ac:picMk id="2" creationId="{E0FDAAEE-3E13-B0F0-6A60-F38D012CD024}"/>
+          </ac:picMkLst>
+        </pc:picChg>
+        <pc:picChg chg="add mod">
+          <ac:chgData name="Божидар Ангелов Димов" userId="S::badimov21@codingburgas.bg::4ac52a7d-f803-4ad0-9c8d-f124f1431ff7" providerId="AD" clId="Web-{2C6FE48B-295C-4D19-A1F2-CCE90BF64105}" dt="2023-11-11T14:47:03.892" v="27" actId="14100"/>
+          <ac:picMkLst>
+            <pc:docMk/>
+            <pc:sldMk cId="0" sldId="259"/>
+            <ac:picMk id="4" creationId="{54E3A86E-89AA-E80D-2F68-DC5EA7A6C7A7}"/>
+          </ac:picMkLst>
+        </pc:picChg>
+      </pc:sldChg>
+    </pc:docChg>
+  </pc:docChgLst>
+  <pc:docChgLst>
+    <pc:chgData name="Явор Димитров Пенков" userId="S::ydpenkov21@codingburgas.bg::c3a3b445-f763-459c-a7a5-c3ef0bd27f8c" providerId="AD" clId="Web-{3C93F2B0-90B3-4DA5-B1AC-63030DFF744E}"/>
+    <pc:docChg chg="addSld modSld">
+      <pc:chgData name="Явор Димитров Пенков" userId="S::ydpenkov21@codingburgas.bg::c3a3b445-f763-459c-a7a5-c3ef0bd27f8c" providerId="AD" clId="Web-{3C93F2B0-90B3-4DA5-B1AC-63030DFF744E}" dt="2023-11-11T14:39:15.001" v="38" actId="1076"/>
+      <pc:docMkLst>
+        <pc:docMk/>
+      </pc:docMkLst>
+      <pc:sldChg chg="addSp modSp new">
+        <pc:chgData name="Явор Димитров Пенков" userId="S::ydpenkov21@codingburgas.bg::c3a3b445-f763-459c-a7a5-c3ef0bd27f8c" providerId="AD" clId="Web-{3C93F2B0-90B3-4DA5-B1AC-63030DFF744E}" dt="2023-11-11T14:39:15.001" v="38" actId="1076"/>
+        <pc:sldMkLst>
+          <pc:docMk/>
+          <pc:sldMk cId="3836415507" sldId="313"/>
+        </pc:sldMkLst>
         <pc:spChg chg="mod">
-          <ac:chgData name="Явор Димитров Пенков" userId="S::ydpenkov21@codingburgas.bg::c3a3b445-f763-459c-a7a5-c3ef0bd27f8c" providerId="AD" clId="Web-{D4E6C40A-D69F-46B6-AE7D-A695D99A5BE3}" dt="2023-11-11T14:45:21.861" v="9" actId="20577"/>
+          <ac:chgData name="Явор Димитров Пенков" userId="S::ydpenkov21@codingburgas.bg::c3a3b445-f763-459c-a7a5-c3ef0bd27f8c" providerId="AD" clId="Web-{3C93F2B0-90B3-4DA5-B1AC-63030DFF744E}" dt="2023-11-11T14:36:20.620" v="2" actId="20577"/>
           <ac:spMkLst>
             <pc:docMk/>
-            <pc:sldMk cId="0" sldId="259"/>
-            <ac:spMk id="3" creationId="{9EE4F092-65F7-707A-7967-A94EB7C0708B}"/>
+            <pc:sldMk cId="3836415507" sldId="313"/>
+            <ac:spMk id="2" creationId="{B23B3162-D531-589B-3BDB-E94BFB52E244}"/>
+          </ac:spMkLst>
+        </pc:spChg>
+        <pc:spChg chg="add mod">
+          <ac:chgData name="Явор Димитров Пенков" userId="S::ydpenkov21@codingburgas.bg::c3a3b445-f763-459c-a7a5-c3ef0bd27f8c" providerId="AD" clId="Web-{3C93F2B0-90B3-4DA5-B1AC-63030DFF744E}" dt="2023-11-11T14:39:15.001" v="38" actId="1076"/>
+          <ac:spMkLst>
+            <pc:docMk/>
+            <pc:sldMk cId="3836415507" sldId="313"/>
+            <ac:spMk id="3" creationId="{3C6DA31C-CCA7-A5AC-0CFC-FD47516AD7EB}"/>
+          </ac:spMkLst>
+        </pc:spChg>
+        <pc:spChg chg="add mod">
+          <ac:chgData name="Явор Димитров Пенков" userId="S::ydpenkov21@codingburgas.bg::c3a3b445-f763-459c-a7a5-c3ef0bd27f8c" providerId="AD" clId="Web-{3C93F2B0-90B3-4DA5-B1AC-63030DFF744E}" dt="2023-11-11T14:38:49.922" v="32" actId="20577"/>
+          <ac:spMkLst>
+            <pc:docMk/>
+            <pc:sldMk cId="3836415507" sldId="313"/>
+            <ac:spMk id="4" creationId="{92BFA970-2AB1-CD9A-FE26-E13623D6FB94}"/>
+          </ac:spMkLst>
+        </pc:spChg>
+        <pc:spChg chg="add mod">
+          <ac:chgData name="Явор Димитров Пенков" userId="S::ydpenkov21@codingburgas.bg::c3a3b445-f763-459c-a7a5-c3ef0bd27f8c" providerId="AD" clId="Web-{3C93F2B0-90B3-4DA5-B1AC-63030DFF744E}" dt="2023-11-11T14:38:52.875" v="33" actId="20577"/>
+          <ac:spMkLst>
+            <pc:docMk/>
+            <pc:sldMk cId="3836415507" sldId="313"/>
+            <ac:spMk id="5" creationId="{030658D8-89B8-7AD1-928D-1D6239FCB0F1}"/>
           </ac:spMkLst>
         </pc:spChg>
       </pc:sldChg>
@@ -692,125 +819,6 @@
             <pc:docMk/>
             <pc:sldMk cId="3836415507" sldId="313"/>
             <ac:spMk id="5" creationId="{030658D8-89B8-7AD1-928D-1D6239FCB0F1}"/>
-          </ac:spMkLst>
-        </pc:spChg>
-      </pc:sldChg>
-    </pc:docChg>
-  </pc:docChgLst>
-  <pc:docChgLst>
-    <pc:chgData name="Божидар Ангелов Димов" userId="S::badimov21@codingburgas.bg::4ac52a7d-f803-4ad0-9c8d-f124f1431ff7" providerId="AD" clId="Web-{B92D2246-FA7D-45BB-8B7D-BABD7FA746E9}"/>
-    <pc:docChg chg="modSld">
-      <pc:chgData name="Божидар Ангелов Димов" userId="S::badimov21@codingburgas.bg::4ac52a7d-f803-4ad0-9c8d-f124f1431ff7" providerId="AD" clId="Web-{B92D2246-FA7D-45BB-8B7D-BABD7FA746E9}" dt="2023-11-11T14:22:17.434" v="57" actId="20577"/>
-      <pc:docMkLst>
-        <pc:docMk/>
-      </pc:docMkLst>
-      <pc:sldChg chg="modSp">
-        <pc:chgData name="Божидар Ангелов Димов" userId="S::badimov21@codingburgas.bg::4ac52a7d-f803-4ad0-9c8d-f124f1431ff7" providerId="AD" clId="Web-{B92D2246-FA7D-45BB-8B7D-BABD7FA746E9}" dt="2023-11-11T14:22:17.434" v="57" actId="20577"/>
-        <pc:sldMkLst>
-          <pc:docMk/>
-          <pc:sldMk cId="3136130408" sldId="311"/>
-        </pc:sldMkLst>
-        <pc:spChg chg="mod">
-          <ac:chgData name="Божидар Ангелов Димов" userId="S::badimov21@codingburgas.bg::4ac52a7d-f803-4ad0-9c8d-f124f1431ff7" providerId="AD" clId="Web-{B92D2246-FA7D-45BB-8B7D-BABD7FA746E9}" dt="2023-11-11T14:22:01.512" v="53" actId="14100"/>
-          <ac:spMkLst>
-            <pc:docMk/>
-            <pc:sldMk cId="3136130408" sldId="311"/>
-            <ac:spMk id="6" creationId="{ADEE3209-B418-3837-29A8-953C8D21CED5}"/>
-          </ac:spMkLst>
-        </pc:spChg>
-        <pc:spChg chg="mod">
-          <ac:chgData name="Божидар Ангелов Димов" userId="S::badimov21@codingburgas.bg::4ac52a7d-f803-4ad0-9c8d-f124f1431ff7" providerId="AD" clId="Web-{B92D2246-FA7D-45BB-8B7D-BABD7FA746E9}" dt="2023-11-11T14:21:56.621" v="52" actId="20577"/>
-          <ac:spMkLst>
-            <pc:docMk/>
-            <pc:sldMk cId="3136130408" sldId="311"/>
-            <ac:spMk id="9" creationId="{E2370115-6C6A-EF8B-821B-53ED8B8FC188}"/>
-          </ac:spMkLst>
-        </pc:spChg>
-        <pc:spChg chg="mod">
-          <ac:chgData name="Божидар Ангелов Димов" userId="S::badimov21@codingburgas.bg::4ac52a7d-f803-4ad0-9c8d-f124f1431ff7" providerId="AD" clId="Web-{B92D2246-FA7D-45BB-8B7D-BABD7FA746E9}" dt="2023-11-11T14:22:06.606" v="55" actId="20577"/>
-          <ac:spMkLst>
-            <pc:docMk/>
-            <pc:sldMk cId="3136130408" sldId="311"/>
-            <ac:spMk id="11" creationId="{23261F7E-B332-1F08-BBD4-A12A39350FFC}"/>
-          </ac:spMkLst>
-        </pc:spChg>
-        <pc:spChg chg="mod">
-          <ac:chgData name="Божидар Ангелов Димов" userId="S::badimov21@codingburgas.bg::4ac52a7d-f803-4ad0-9c8d-f124f1431ff7" providerId="AD" clId="Web-{B92D2246-FA7D-45BB-8B7D-BABD7FA746E9}" dt="2023-11-11T14:22:17.434" v="57" actId="20577"/>
-          <ac:spMkLst>
-            <pc:docMk/>
-            <pc:sldMk cId="3136130408" sldId="311"/>
-            <ac:spMk id="13" creationId="{0CD6A70E-B909-F87C-95FF-2633998A354F}"/>
-          </ac:spMkLst>
-        </pc:spChg>
-        <pc:picChg chg="mod">
-          <ac:chgData name="Божидар Ангелов Димов" userId="S::badimov21@codingburgas.bg::4ac52a7d-f803-4ad0-9c8d-f124f1431ff7" providerId="AD" clId="Web-{B92D2246-FA7D-45BB-8B7D-BABD7FA746E9}" dt="2023-11-11T14:21:01.198" v="41" actId="14100"/>
-          <ac:picMkLst>
-            <pc:docMk/>
-            <pc:sldMk cId="3136130408" sldId="311"/>
-            <ac:picMk id="17" creationId="{4627DF91-4A7A-487E-929E-D03319286854}"/>
-          </ac:picMkLst>
-        </pc:picChg>
-        <pc:picChg chg="mod">
-          <ac:chgData name="Божидар Ангелов Димов" userId="S::badimov21@codingburgas.bg::4ac52a7d-f803-4ad0-9c8d-f124f1431ff7" providerId="AD" clId="Web-{B92D2246-FA7D-45BB-8B7D-BABD7FA746E9}" dt="2023-11-11T14:21:03.713" v="42" actId="14100"/>
-          <ac:picMkLst>
-            <pc:docMk/>
-            <pc:sldMk cId="3136130408" sldId="311"/>
-            <ac:picMk id="19" creationId="{D00790F8-C95B-9A96-C3F2-2CC386C944DD}"/>
-          </ac:picMkLst>
-        </pc:picChg>
-        <pc:picChg chg="mod">
-          <ac:chgData name="Божидар Ангелов Димов" userId="S::badimov21@codingburgas.bg::4ac52a7d-f803-4ad0-9c8d-f124f1431ff7" providerId="AD" clId="Web-{B92D2246-FA7D-45BB-8B7D-BABD7FA746E9}" dt="2023-11-11T14:21:05.432" v="43" actId="14100"/>
-          <ac:picMkLst>
-            <pc:docMk/>
-            <pc:sldMk cId="3136130408" sldId="311"/>
-            <ac:picMk id="21" creationId="{5ACE420D-A20B-D9F3-F245-4FF783DFAFF8}"/>
-          </ac:picMkLst>
-        </pc:picChg>
-      </pc:sldChg>
-    </pc:docChg>
-  </pc:docChgLst>
-  <pc:docChgLst>
-    <pc:chgData name="Божидар Ангелов Димов" userId="S::badimov21@codingburgas.bg::4ac52a7d-f803-4ad0-9c8d-f124f1431ff7" providerId="AD" clId="Web-{F9B3E8E2-2A32-43A3-ACB5-50410F22469B}"/>
-    <pc:docChg chg="modSld">
-      <pc:chgData name="Божидар Ангелов Димов" userId="S::badimov21@codingburgas.bg::4ac52a7d-f803-4ad0-9c8d-f124f1431ff7" providerId="AD" clId="Web-{F9B3E8E2-2A32-43A3-ACB5-50410F22469B}" dt="2023-11-11T14:18:45.551" v="51" actId="20577"/>
-      <pc:docMkLst>
-        <pc:docMk/>
-      </pc:docMkLst>
-      <pc:sldChg chg="modSp">
-        <pc:chgData name="Божидар Ангелов Димов" userId="S::badimov21@codingburgas.bg::4ac52a7d-f803-4ad0-9c8d-f124f1431ff7" providerId="AD" clId="Web-{F9B3E8E2-2A32-43A3-ACB5-50410F22469B}" dt="2023-11-11T14:17:57.878" v="7" actId="20577"/>
-        <pc:sldMkLst>
-          <pc:docMk/>
-          <pc:sldMk cId="0" sldId="268"/>
-        </pc:sldMkLst>
-        <pc:spChg chg="mod">
-          <ac:chgData name="Божидар Ангелов Димов" userId="S::badimov21@codingburgas.bg::4ac52a7d-f803-4ad0-9c8d-f124f1431ff7" providerId="AD" clId="Web-{F9B3E8E2-2A32-43A3-ACB5-50410F22469B}" dt="2023-11-11T14:17:57.878" v="7" actId="20577"/>
-          <ac:spMkLst>
-            <pc:docMk/>
-            <pc:sldMk cId="0" sldId="268"/>
-            <ac:spMk id="682" creationId="{00000000-0000-0000-0000-000000000000}"/>
-          </ac:spMkLst>
-        </pc:spChg>
-      </pc:sldChg>
-      <pc:sldChg chg="modSp">
-        <pc:chgData name="Божидар Ангелов Димов" userId="S::badimov21@codingburgas.bg::4ac52a7d-f803-4ad0-9c8d-f124f1431ff7" providerId="AD" clId="Web-{F9B3E8E2-2A32-43A3-ACB5-50410F22469B}" dt="2023-11-11T14:18:45.551" v="51" actId="20577"/>
-        <pc:sldMkLst>
-          <pc:docMk/>
-          <pc:sldMk cId="3136130408" sldId="311"/>
-        </pc:sldMkLst>
-        <pc:spChg chg="mod">
-          <ac:chgData name="Божидар Ангелов Димов" userId="S::badimov21@codingburgas.bg::4ac52a7d-f803-4ad0-9c8d-f124f1431ff7" providerId="AD" clId="Web-{F9B3E8E2-2A32-43A3-ACB5-50410F22469B}" dt="2023-11-11T14:18:32.270" v="31" actId="1076"/>
-          <ac:spMkLst>
-            <pc:docMk/>
-            <pc:sldMk cId="3136130408" sldId="311"/>
-            <ac:spMk id="6" creationId="{ADEE3209-B418-3837-29A8-953C8D21CED5}"/>
-          </ac:spMkLst>
-        </pc:spChg>
-        <pc:spChg chg="mod">
-          <ac:chgData name="Божидар Ангелов Димов" userId="S::badimov21@codingburgas.bg::4ac52a7d-f803-4ad0-9c8d-f124f1431ff7" providerId="AD" clId="Web-{F9B3E8E2-2A32-43A3-ACB5-50410F22469B}" dt="2023-11-11T14:18:45.551" v="51" actId="20577"/>
-          <ac:spMkLst>
-            <pc:docMk/>
-            <pc:sldMk cId="3136130408" sldId="311"/>
-            <ac:spMk id="9" creationId="{E2370115-6C6A-EF8B-821B-53ED8B8FC188}"/>
           </ac:spMkLst>
         </pc:spChg>
       </pc:sldChg>
@@ -21583,7 +21591,7 @@
         </p:blipFill>
         <p:spPr>
           <a:xfrm flipH="1" flipV="1">
-            <a:off x="5857875" y="2841173"/>
+            <a:off x="5860829" y="2980666"/>
             <a:ext cx="865415" cy="865414"/>
           </a:xfrm>
           <a:prstGeom prst="rect">

</xml_diff>